<commit_message>
change order of the slides
</commit_message>
<xml_diff>
--- a/Abschlusspräsentation.pptx
+++ b/Abschlusspräsentation.pptx
@@ -19,12 +19,12 @@
     <p:sldId id="263" r:id="rId7"/>
     <p:sldId id="282" r:id="rId8"/>
     <p:sldId id="285" r:id="rId9"/>
-    <p:sldId id="271" r:id="rId10"/>
-    <p:sldId id="272" r:id="rId11"/>
-    <p:sldId id="273" r:id="rId12"/>
-    <p:sldId id="291" r:id="rId13"/>
-    <p:sldId id="269" r:id="rId14"/>
-    <p:sldId id="270" r:id="rId15"/>
+    <p:sldId id="269" r:id="rId10"/>
+    <p:sldId id="270" r:id="rId11"/>
+    <p:sldId id="271" r:id="rId12"/>
+    <p:sldId id="272" r:id="rId13"/>
+    <p:sldId id="273" r:id="rId14"/>
+    <p:sldId id="291" r:id="rId15"/>
     <p:sldId id="292" r:id="rId16"/>
     <p:sldId id="293" r:id="rId17"/>
     <p:sldId id="294" r:id="rId18"/>
@@ -4300,7 +4300,7 @@
           <a:graphicData uri="http://schemas.openxmlformats.org/presentationml/2006/ole">
             <mc:AlternateContent xmlns:mc="http://schemas.openxmlformats.org/markup-compatibility/2006">
               <mc:Choice xmlns:v="urn:schemas-microsoft-com:vml" Requires="v">
-                <p:oleObj spid="_x0000_s34868" name="Acrobat Document" r:id="rId3" imgW="5904762" imgH="1952898" progId="AcroExch.Document.7">
+                <p:oleObj spid="_x0000_s34869" name="Acrobat Document" r:id="rId3" imgW="5904762" imgH="1952898" progId="AcroExch.Document.7">
                   <p:embed/>
                 </p:oleObj>
               </mc:Choice>
@@ -6053,6 +6053,582 @@
 </file>
 
 <file path=ppt/slides/slide10.xml><?xml version="1.0" encoding="utf-8"?>
+<p:sld xmlns:a="http://schemas.openxmlformats.org/drawingml/2006/main" xmlns:r="http://schemas.openxmlformats.org/officeDocument/2006/relationships" xmlns:p="http://schemas.openxmlformats.org/presentationml/2006/main">
+  <p:cSld>
+    <p:spTree>
+      <p:nvGrpSpPr>
+        <p:cNvPr id="1" name=""/>
+        <p:cNvGrpSpPr/>
+        <p:nvPr/>
+      </p:nvGrpSpPr>
+      <p:grpSpPr>
+        <a:xfrm>
+          <a:off x="0" y="0"/>
+          <a:ext cx="0" cy="0"/>
+          <a:chOff x="0" y="0"/>
+          <a:chExt cx="0" cy="0"/>
+        </a:xfrm>
+      </p:grpSpPr>
+      <p:sp>
+        <p:nvSpPr>
+          <p:cNvPr id="2" name="Titel 1">
+            <a:extLst>
+              <a:ext uri="{FF2B5EF4-FFF2-40B4-BE49-F238E27FC236}">
+                <a16:creationId xmlns:a16="http://schemas.microsoft.com/office/drawing/2014/main" id="{0B646666-F26D-4D41-AA28-09443F3F26E6}"/>
+              </a:ext>
+            </a:extLst>
+          </p:cNvPr>
+          <p:cNvSpPr>
+            <a:spLocks noGrp="1"/>
+          </p:cNvSpPr>
+          <p:nvPr>
+            <p:ph type="title"/>
+          </p:nvPr>
+        </p:nvSpPr>
+        <p:spPr/>
+        <p:txBody>
+          <a:bodyPr>
+            <a:normAutofit fontScale="90000"/>
+          </a:bodyPr>
+          <a:lstStyle/>
+          <a:p>
+            <a:r>
+              <a:rPr lang="de-DE" dirty="0"/>
+              <a:t>Cluster-</a:t>
+            </a:r>
+            <a:r>
+              <a:rPr lang="de-DE" dirty="0" err="1"/>
+              <a:t>Recommendation</a:t>
+            </a:r>
+            <a:r>
+              <a:rPr lang="de-DE" dirty="0"/>
+              <a:t>-Tests: Punkteverteilung</a:t>
+            </a:r>
+          </a:p>
+        </p:txBody>
+      </p:sp>
+      <p:sp>
+        <p:nvSpPr>
+          <p:cNvPr id="3" name="Inhaltsplatzhalter 2">
+            <a:extLst>
+              <a:ext uri="{FF2B5EF4-FFF2-40B4-BE49-F238E27FC236}">
+                <a16:creationId xmlns:a16="http://schemas.microsoft.com/office/drawing/2014/main" id="{F360894D-5F24-4171-987F-91E796A9486C}"/>
+              </a:ext>
+            </a:extLst>
+          </p:cNvPr>
+          <p:cNvSpPr>
+            <a:spLocks noGrp="1"/>
+          </p:cNvSpPr>
+          <p:nvPr>
+            <p:ph idx="1"/>
+          </p:nvPr>
+        </p:nvSpPr>
+        <p:spPr/>
+        <p:txBody>
+          <a:bodyPr/>
+          <a:lstStyle/>
+          <a:p>
+            <a:endParaRPr lang="de-DE" dirty="0"/>
+          </a:p>
+        </p:txBody>
+      </p:sp>
+      <p:graphicFrame>
+        <p:nvGraphicFramePr>
+          <p:cNvPr id="4" name="Tabelle 3">
+            <a:extLst>
+              <a:ext uri="{FF2B5EF4-FFF2-40B4-BE49-F238E27FC236}">
+                <a16:creationId xmlns:a16="http://schemas.microsoft.com/office/drawing/2014/main" id="{2F38C89D-1077-4C8F-B19E-BE3421D6AD9F}"/>
+              </a:ext>
+            </a:extLst>
+          </p:cNvPr>
+          <p:cNvGraphicFramePr>
+            <a:graphicFrameLocks noGrp="1"/>
+          </p:cNvGraphicFramePr>
+          <p:nvPr>
+            <p:extLst/>
+          </p:nvPr>
+        </p:nvGraphicFramePr>
+        <p:xfrm>
+          <a:off x="1298713" y="1934558"/>
+          <a:ext cx="6546574" cy="2828766"/>
+        </p:xfrm>
+        <a:graphic>
+          <a:graphicData uri="http://schemas.openxmlformats.org/drawingml/2006/table">
+            <a:tbl>
+              <a:tblPr firstRow="1" bandRow="1">
+                <a:tableStyleId>{D27102A9-8310-4765-A935-A1911B00CA55}</a:tableStyleId>
+              </a:tblPr>
+              <a:tblGrid>
+                <a:gridCol w="4959741">
+                  <a:extLst>
+                    <a:ext uri="{9D8B030D-6E8A-4147-A177-3AD203B41FA5}">
+                      <a16:colId xmlns:a16="http://schemas.microsoft.com/office/drawing/2014/main" val="236739624"/>
+                    </a:ext>
+                  </a:extLst>
+                </a:gridCol>
+                <a:gridCol w="1586833">
+                  <a:extLst>
+                    <a:ext uri="{9D8B030D-6E8A-4147-A177-3AD203B41FA5}">
+                      <a16:colId xmlns:a16="http://schemas.microsoft.com/office/drawing/2014/main" val="3613010800"/>
+                    </a:ext>
+                  </a:extLst>
+                </a:gridCol>
+              </a:tblGrid>
+              <a:tr h="471461">
+                <a:tc>
+                  <a:txBody>
+                    <a:bodyPr/>
+                    <a:lstStyle/>
+                    <a:p>
+                      <a:r>
+                        <a:rPr lang="de-DE" sz="1400" dirty="0"/>
+                        <a:t>Einteilung</a:t>
+                      </a:r>
+                    </a:p>
+                  </a:txBody>
+                  <a:tcPr marL="68580" marR="68580" marT="34290" marB="34290" anchor="ctr"/>
+                </a:tc>
+                <a:tc>
+                  <a:txBody>
+                    <a:bodyPr/>
+                    <a:lstStyle/>
+                    <a:p>
+                      <a:r>
+                        <a:rPr lang="de-DE" sz="1400" dirty="0"/>
+                        <a:t>Punktzahl</a:t>
+                      </a:r>
+                    </a:p>
+                  </a:txBody>
+                  <a:tcPr marL="68580" marR="68580" marT="34290" marB="34290" anchor="ctr"/>
+                </a:tc>
+                <a:extLst>
+                  <a:ext uri="{0D108BD9-81ED-4DB2-BD59-A6C34878D82A}">
+                    <a16:rowId xmlns:a16="http://schemas.microsoft.com/office/drawing/2014/main" val="684904303"/>
+                  </a:ext>
+                </a:extLst>
+              </a:tr>
+              <a:tr h="471461">
+                <a:tc>
+                  <a:txBody>
+                    <a:bodyPr/>
+                    <a:lstStyle/>
+                    <a:p>
+                      <a:r>
+                        <a:rPr lang="de-DE" sz="1400" dirty="0"/>
+                        <a:t>Songs im selben Cluster</a:t>
+                      </a:r>
+                    </a:p>
+                  </a:txBody>
+                  <a:tcPr marL="68580" marR="68580" marT="34290" marB="34290" anchor="ctr"/>
+                </a:tc>
+                <a:tc>
+                  <a:txBody>
+                    <a:bodyPr/>
+                    <a:lstStyle/>
+                    <a:p>
+                      <a:r>
+                        <a:rPr lang="de-DE" sz="1400" dirty="0"/>
+                        <a:t>8-10 Punkte</a:t>
+                      </a:r>
+                    </a:p>
+                  </a:txBody>
+                  <a:tcPr marL="68580" marR="68580" marT="34290" marB="34290" anchor="ctr"/>
+                </a:tc>
+                <a:extLst>
+                  <a:ext uri="{0D108BD9-81ED-4DB2-BD59-A6C34878D82A}">
+                    <a16:rowId xmlns:a16="http://schemas.microsoft.com/office/drawing/2014/main" val="163419379"/>
+                  </a:ext>
+                </a:extLst>
+              </a:tr>
+              <a:tr h="471461">
+                <a:tc>
+                  <a:txBody>
+                    <a:bodyPr/>
+                    <a:lstStyle/>
+                    <a:p>
+                      <a:r>
+                        <a:rPr lang="de-DE" sz="1400" dirty="0"/>
+                        <a:t>Zentren-Distanz ≤ 10% von der durchschnittlichen Distanz</a:t>
+                      </a:r>
+                    </a:p>
+                  </a:txBody>
+                  <a:tcPr marL="68580" marR="68580" marT="34290" marB="34290" anchor="ctr"/>
+                </a:tc>
+                <a:tc>
+                  <a:txBody>
+                    <a:bodyPr/>
+                    <a:lstStyle/>
+                    <a:p>
+                      <a:r>
+                        <a:rPr lang="de-DE" sz="1400" dirty="0"/>
+                        <a:t>6-7 Punkte</a:t>
+                      </a:r>
+                    </a:p>
+                  </a:txBody>
+                  <a:tcPr marL="68580" marR="68580" marT="34290" marB="34290" anchor="ctr"/>
+                </a:tc>
+                <a:extLst>
+                  <a:ext uri="{0D108BD9-81ED-4DB2-BD59-A6C34878D82A}">
+                    <a16:rowId xmlns:a16="http://schemas.microsoft.com/office/drawing/2014/main" val="3871737911"/>
+                  </a:ext>
+                </a:extLst>
+              </a:tr>
+              <a:tr h="471461">
+                <a:tc>
+                  <a:txBody>
+                    <a:bodyPr/>
+                    <a:lstStyle/>
+                    <a:p>
+                      <a:r>
+                        <a:rPr lang="de-DE" sz="1400" dirty="0"/>
+                        <a:t>Zentren-Distanz ≤ 25% von der durchschnittlichen Distanz</a:t>
+                      </a:r>
+                    </a:p>
+                  </a:txBody>
+                  <a:tcPr marL="68580" marR="68580" marT="34290" marB="34290" anchor="ctr"/>
+                </a:tc>
+                <a:tc>
+                  <a:txBody>
+                    <a:bodyPr/>
+                    <a:lstStyle/>
+                    <a:p>
+                      <a:r>
+                        <a:rPr lang="de-DE" sz="1400" dirty="0"/>
+                        <a:t>4-5 Punkte</a:t>
+                      </a:r>
+                    </a:p>
+                  </a:txBody>
+                  <a:tcPr marL="68580" marR="68580" marT="34290" marB="34290" anchor="ctr"/>
+                </a:tc>
+                <a:extLst>
+                  <a:ext uri="{0D108BD9-81ED-4DB2-BD59-A6C34878D82A}">
+                    <a16:rowId xmlns:a16="http://schemas.microsoft.com/office/drawing/2014/main" val="3214466596"/>
+                  </a:ext>
+                </a:extLst>
+              </a:tr>
+              <a:tr h="471461">
+                <a:tc>
+                  <a:txBody>
+                    <a:bodyPr/>
+                    <a:lstStyle/>
+                    <a:p>
+                      <a:r>
+                        <a:rPr lang="de-DE" sz="1400" dirty="0"/>
+                        <a:t>Zentren-Distanz ≤ 50% von der durchschnittlichen Distanz</a:t>
+                      </a:r>
+                    </a:p>
+                  </a:txBody>
+                  <a:tcPr marL="68580" marR="68580" marT="34290" marB="34290" anchor="ctr"/>
+                </a:tc>
+                <a:tc>
+                  <a:txBody>
+                    <a:bodyPr/>
+                    <a:lstStyle/>
+                    <a:p>
+                      <a:r>
+                        <a:rPr lang="de-DE" sz="1400" dirty="0"/>
+                        <a:t>2-3 Punkte</a:t>
+                      </a:r>
+                    </a:p>
+                  </a:txBody>
+                  <a:tcPr marL="68580" marR="68580" marT="34290" marB="34290" anchor="ctr"/>
+                </a:tc>
+                <a:extLst>
+                  <a:ext uri="{0D108BD9-81ED-4DB2-BD59-A6C34878D82A}">
+                    <a16:rowId xmlns:a16="http://schemas.microsoft.com/office/drawing/2014/main" val="4261290450"/>
+                  </a:ext>
+                </a:extLst>
+              </a:tr>
+              <a:tr h="471461">
+                <a:tc>
+                  <a:txBody>
+                    <a:bodyPr/>
+                    <a:lstStyle/>
+                    <a:p>
+                      <a:r>
+                        <a:rPr lang="de-DE" sz="1400" dirty="0"/>
+                        <a:t>Restliche Songs</a:t>
+                      </a:r>
+                    </a:p>
+                  </a:txBody>
+                  <a:tcPr marL="68580" marR="68580" marT="34290" marB="34290" anchor="ctr"/>
+                </a:tc>
+                <a:tc>
+                  <a:txBody>
+                    <a:bodyPr/>
+                    <a:lstStyle/>
+                    <a:p>
+                      <a:r>
+                        <a:rPr lang="de-DE" sz="1400" dirty="0"/>
+                        <a:t>0 Punkte</a:t>
+                      </a:r>
+                    </a:p>
+                  </a:txBody>
+                  <a:tcPr marL="68580" marR="68580" marT="34290" marB="34290" anchor="ctr"/>
+                </a:tc>
+                <a:extLst>
+                  <a:ext uri="{0D108BD9-81ED-4DB2-BD59-A6C34878D82A}">
+                    <a16:rowId xmlns:a16="http://schemas.microsoft.com/office/drawing/2014/main" val="2054115088"/>
+                  </a:ext>
+                </a:extLst>
+              </a:tr>
+            </a:tbl>
+          </a:graphicData>
+        </a:graphic>
+      </p:graphicFrame>
+      <p:sp>
+        <p:nvSpPr>
+          <p:cNvPr id="5" name="Fußzeilenplatzhalter 4">
+            <a:extLst>
+              <a:ext uri="{FF2B5EF4-FFF2-40B4-BE49-F238E27FC236}">
+                <a16:creationId xmlns:a16="http://schemas.microsoft.com/office/drawing/2014/main" id="{9EFA1EE3-BB25-DC4D-8942-CAD569845431}"/>
+              </a:ext>
+            </a:extLst>
+          </p:cNvPr>
+          <p:cNvSpPr>
+            <a:spLocks noGrp="1"/>
+          </p:cNvSpPr>
+          <p:nvPr>
+            <p:ph type="ftr" sz="quarter" idx="11"/>
+          </p:nvPr>
+        </p:nvSpPr>
+        <p:spPr/>
+        <p:txBody>
+          <a:bodyPr/>
+          <a:lstStyle/>
+          <a:p>
+            <a:pPr>
+              <a:defRPr/>
+            </a:pPr>
+            <a:r>
+              <a:rPr lang="en-US"/>
+              <a:t>Jiayi Wang, Tim André Zimmermann, Julian Zenker</a:t>
+            </a:r>
+          </a:p>
+        </p:txBody>
+      </p:sp>
+    </p:spTree>
+    <p:extLst>
+      <p:ext uri="{BB962C8B-B14F-4D97-AF65-F5344CB8AC3E}">
+        <p14:creationId xmlns:p14="http://schemas.microsoft.com/office/powerpoint/2010/main" val="1276786592"/>
+      </p:ext>
+    </p:extLst>
+  </p:cSld>
+  <p:clrMapOvr>
+    <a:masterClrMapping/>
+  </p:clrMapOvr>
+  <mc:AlternateContent xmlns:mc="http://schemas.openxmlformats.org/markup-compatibility/2006" xmlns:p14="http://schemas.microsoft.com/office/powerpoint/2010/main">
+    <mc:Choice Requires="p14">
+      <p:transition spd="slow" p14:dur="1300">
+        <p14:pan/>
+      </p:transition>
+    </mc:Choice>
+    <mc:Fallback xmlns="">
+      <p:transition spd="slow">
+        <p:fade/>
+      </p:transition>
+    </mc:Fallback>
+  </mc:AlternateContent>
+</p:sld>
+</file>
+
+<file path=ppt/slides/slide11.xml><?xml version="1.0" encoding="utf-8"?>
+<p:sld xmlns:a="http://schemas.openxmlformats.org/drawingml/2006/main" xmlns:r="http://schemas.openxmlformats.org/officeDocument/2006/relationships" xmlns:p="http://schemas.openxmlformats.org/presentationml/2006/main">
+  <p:cSld>
+    <p:spTree>
+      <p:nvGrpSpPr>
+        <p:cNvPr id="1" name=""/>
+        <p:cNvGrpSpPr/>
+        <p:nvPr/>
+      </p:nvGrpSpPr>
+      <p:grpSpPr>
+        <a:xfrm>
+          <a:off x="0" y="0"/>
+          <a:ext cx="0" cy="0"/>
+          <a:chOff x="0" y="0"/>
+          <a:chExt cx="0" cy="0"/>
+        </a:xfrm>
+      </p:grpSpPr>
+      <p:sp>
+        <p:nvSpPr>
+          <p:cNvPr id="3" name="Inhaltsplatzhalter 2">
+            <a:extLst>
+              <a:ext uri="{FF2B5EF4-FFF2-40B4-BE49-F238E27FC236}">
+                <a16:creationId xmlns:a16="http://schemas.microsoft.com/office/drawing/2014/main" id="{73B83135-BA91-4DEA-A04F-118EB307111D}"/>
+              </a:ext>
+            </a:extLst>
+          </p:cNvPr>
+          <p:cNvSpPr>
+            <a:spLocks noGrp="1"/>
+          </p:cNvSpPr>
+          <p:nvPr>
+            <p:ph idx="1"/>
+          </p:nvPr>
+        </p:nvSpPr>
+        <p:spPr/>
+        <p:txBody>
+          <a:bodyPr/>
+          <a:lstStyle/>
+          <a:p>
+            <a:r>
+              <a:rPr lang="de-DE" sz="2400" dirty="0"/>
+              <a:t>Vergleich mit den User Counts:</a:t>
+            </a:r>
+          </a:p>
+          <a:p>
+            <a:pPr lvl="1">
+              <a:buFont typeface="Wingdings" pitchFamily="2" charset="2"/>
+              <a:buChar char="§"/>
+            </a:pPr>
+            <a:r>
+              <a:rPr lang="de-DE" dirty="0"/>
+              <a:t>Die Songs, die nur einmal von einem User gehört wurden, als „nicht gemocht“ betrachten</a:t>
+            </a:r>
+            <a:br>
+              <a:rPr lang="de-DE" dirty="0"/>
+            </a:br>
+            <a:r>
+              <a:rPr lang="de-DE" dirty="0">
+                <a:sym typeface="Wingdings" panose="05000000000000000000" pitchFamily="2" charset="2"/>
+              </a:rPr>
+              <a:t> Welche Bewertungen haben solche Songs?</a:t>
+            </a:r>
+          </a:p>
+          <a:p>
+            <a:pPr lvl="1">
+              <a:buFont typeface="Wingdings" pitchFamily="2" charset="2"/>
+              <a:buChar char="§"/>
+            </a:pPr>
+            <a:endParaRPr lang="de-DE" dirty="0">
+              <a:sym typeface="Wingdings" panose="05000000000000000000" pitchFamily="2" charset="2"/>
+            </a:endParaRPr>
+          </a:p>
+          <a:p>
+            <a:pPr lvl="1">
+              <a:buFont typeface="Wingdings" pitchFamily="2" charset="2"/>
+              <a:buChar char="§"/>
+            </a:pPr>
+            <a:r>
+              <a:rPr lang="de-DE" dirty="0">
+                <a:sym typeface="Wingdings" panose="05000000000000000000" pitchFamily="2" charset="2"/>
+              </a:rPr>
+              <a:t>Ergebnis:</a:t>
+            </a:r>
+            <a:br>
+              <a:rPr lang="de-DE" dirty="0">
+                <a:sym typeface="Wingdings" panose="05000000000000000000" pitchFamily="2" charset="2"/>
+              </a:rPr>
+            </a:br>
+            <a:r>
+              <a:rPr lang="de-DE" dirty="0">
+                <a:sym typeface="Wingdings" panose="05000000000000000000" pitchFamily="2" charset="2"/>
+              </a:rPr>
+              <a:t> Deutlich verbesserungswürdig – die nicht gemochten Songs haben nur etwas weniger Punkte als die gemochten</a:t>
+            </a:r>
+            <a:endParaRPr lang="de-DE" dirty="0"/>
+          </a:p>
+        </p:txBody>
+      </p:sp>
+      <p:sp>
+        <p:nvSpPr>
+          <p:cNvPr id="4" name="Fußzeilenplatzhalter 3">
+            <a:extLst>
+              <a:ext uri="{FF2B5EF4-FFF2-40B4-BE49-F238E27FC236}">
+                <a16:creationId xmlns:a16="http://schemas.microsoft.com/office/drawing/2014/main" id="{B7CFE3D1-D86D-AF4C-A1AC-18D8F34B7D71}"/>
+              </a:ext>
+            </a:extLst>
+          </p:cNvPr>
+          <p:cNvSpPr>
+            <a:spLocks noGrp="1"/>
+          </p:cNvSpPr>
+          <p:nvPr>
+            <p:ph type="ftr" sz="quarter" idx="11"/>
+          </p:nvPr>
+        </p:nvSpPr>
+        <p:spPr/>
+        <p:txBody>
+          <a:bodyPr/>
+          <a:lstStyle/>
+          <a:p>
+            <a:pPr>
+              <a:defRPr/>
+            </a:pPr>
+            <a:r>
+              <a:rPr lang="en-US"/>
+              <a:t>Jiayi Wang, Tim André Zimmermann, Julian Zenker</a:t>
+            </a:r>
+          </a:p>
+        </p:txBody>
+      </p:sp>
+      <p:sp>
+        <p:nvSpPr>
+          <p:cNvPr id="7" name="Titel 1">
+            <a:extLst>
+              <a:ext uri="{FF2B5EF4-FFF2-40B4-BE49-F238E27FC236}">
+                <a16:creationId xmlns:a16="http://schemas.microsoft.com/office/drawing/2014/main" id="{048C01C5-291D-4951-9D60-9795FC9B320F}"/>
+              </a:ext>
+            </a:extLst>
+          </p:cNvPr>
+          <p:cNvSpPr>
+            <a:spLocks noGrp="1"/>
+          </p:cNvSpPr>
+          <p:nvPr>
+            <p:ph type="title"/>
+          </p:nvPr>
+        </p:nvSpPr>
+        <p:spPr>
+          <a:xfrm>
+            <a:off x="323528" y="332656"/>
+            <a:ext cx="8385497" cy="719137"/>
+          </a:xfrm>
+        </p:spPr>
+        <p:txBody>
+          <a:bodyPr>
+            <a:normAutofit fontScale="90000"/>
+          </a:bodyPr>
+          <a:lstStyle/>
+          <a:p>
+            <a:r>
+              <a:rPr lang="de-DE" dirty="0"/>
+              <a:t>Güte des </a:t>
+            </a:r>
+            <a:r>
+              <a:rPr lang="de-DE" dirty="0" err="1"/>
+              <a:t>Clusterings</a:t>
+            </a:r>
+            <a:r>
+              <a:rPr lang="de-DE" dirty="0"/>
+              <a:t> – Punkte der (nicht) gemochten Songs</a:t>
+            </a:r>
+          </a:p>
+        </p:txBody>
+      </p:sp>
+    </p:spTree>
+    <p:extLst>
+      <p:ext uri="{BB962C8B-B14F-4D97-AF65-F5344CB8AC3E}">
+        <p14:creationId xmlns:p14="http://schemas.microsoft.com/office/powerpoint/2010/main" val="2427338943"/>
+      </p:ext>
+    </p:extLst>
+  </p:cSld>
+  <p:clrMapOvr>
+    <a:masterClrMapping/>
+  </p:clrMapOvr>
+  <mc:AlternateContent xmlns:mc="http://schemas.openxmlformats.org/markup-compatibility/2006" xmlns:p14="http://schemas.microsoft.com/office/powerpoint/2010/main">
+    <mc:Choice Requires="p14">
+      <p:transition spd="slow" p14:dur="1300">
+        <p14:pan/>
+      </p:transition>
+    </mc:Choice>
+    <mc:Fallback xmlns="">
+      <p:transition spd="slow">
+        <p:fade/>
+      </p:transition>
+    </mc:Fallback>
+  </mc:AlternateContent>
+</p:sld>
+</file>
+
+<file path=ppt/slides/slide12.xml><?xml version="1.0" encoding="utf-8"?>
 <p:sld xmlns:a="http://schemas.openxmlformats.org/drawingml/2006/main" xmlns:r="http://schemas.openxmlformats.org/officeDocument/2006/relationships" xmlns:p="http://schemas.openxmlformats.org/presentationml/2006/main">
   <p:cSld>
     <p:spTree>
@@ -7125,7 +7701,7 @@
 </p:sld>
 </file>
 
-<file path=ppt/slides/slide11.xml><?xml version="1.0" encoding="utf-8"?>
+<file path=ppt/slides/slide13.xml><?xml version="1.0" encoding="utf-8"?>
 <p:sld xmlns:a="http://schemas.openxmlformats.org/drawingml/2006/main" xmlns:r="http://schemas.openxmlformats.org/officeDocument/2006/relationships" xmlns:p="http://schemas.openxmlformats.org/presentationml/2006/main">
   <p:cSld>
     <p:spTree>
@@ -8482,7 +9058,7 @@
 </p:sld>
 </file>
 
-<file path=ppt/slides/slide12.xml><?xml version="1.0" encoding="utf-8"?>
+<file path=ppt/slides/slide14.xml><?xml version="1.0" encoding="utf-8"?>
 <p:sld xmlns:a="http://schemas.openxmlformats.org/drawingml/2006/main" xmlns:r="http://schemas.openxmlformats.org/officeDocument/2006/relationships" xmlns:p="http://schemas.openxmlformats.org/presentationml/2006/main">
   <p:cSld>
     <p:spTree>
@@ -8742,536 +9318,6 @@
     <p:extLst>
       <p:ext uri="{BB962C8B-B14F-4D97-AF65-F5344CB8AC3E}">
         <p14:creationId xmlns:p14="http://schemas.microsoft.com/office/powerpoint/2010/main" val="1525394404"/>
-      </p:ext>
-    </p:extLst>
-  </p:cSld>
-  <p:clrMapOvr>
-    <a:masterClrMapping/>
-  </p:clrMapOvr>
-  <mc:AlternateContent xmlns:mc="http://schemas.openxmlformats.org/markup-compatibility/2006" xmlns:p14="http://schemas.microsoft.com/office/powerpoint/2010/main">
-    <mc:Choice Requires="p14">
-      <p:transition spd="slow" p14:dur="1300">
-        <p14:pan/>
-      </p:transition>
-    </mc:Choice>
-    <mc:Fallback xmlns="">
-      <p:transition spd="slow">
-        <p:fade/>
-      </p:transition>
-    </mc:Fallback>
-  </mc:AlternateContent>
-</p:sld>
-</file>
-
-<file path=ppt/slides/slide13.xml><?xml version="1.0" encoding="utf-8"?>
-<p:sld xmlns:a="http://schemas.openxmlformats.org/drawingml/2006/main" xmlns:r="http://schemas.openxmlformats.org/officeDocument/2006/relationships" xmlns:p="http://schemas.openxmlformats.org/presentationml/2006/main">
-  <p:cSld>
-    <p:spTree>
-      <p:nvGrpSpPr>
-        <p:cNvPr id="1" name=""/>
-        <p:cNvGrpSpPr/>
-        <p:nvPr/>
-      </p:nvGrpSpPr>
-      <p:grpSpPr>
-        <a:xfrm>
-          <a:off x="0" y="0"/>
-          <a:ext cx="0" cy="0"/>
-          <a:chOff x="0" y="0"/>
-          <a:chExt cx="0" cy="0"/>
-        </a:xfrm>
-      </p:grpSpPr>
-      <p:sp>
-        <p:nvSpPr>
-          <p:cNvPr id="2" name="Titel 1">
-            <a:extLst>
-              <a:ext uri="{FF2B5EF4-FFF2-40B4-BE49-F238E27FC236}">
-                <a16:creationId xmlns:a16="http://schemas.microsoft.com/office/drawing/2014/main" id="{2D2DCD53-DC03-4F6C-B120-8945AF9981E4}"/>
-              </a:ext>
-            </a:extLst>
-          </p:cNvPr>
-          <p:cNvSpPr>
-            <a:spLocks noGrp="1"/>
-          </p:cNvSpPr>
-          <p:nvPr>
-            <p:ph type="title"/>
-          </p:nvPr>
-        </p:nvSpPr>
-        <p:spPr/>
-        <p:txBody>
-          <a:bodyPr/>
-          <a:lstStyle/>
-          <a:p>
-            <a:r>
-              <a:rPr lang="de-DE" dirty="0"/>
-              <a:t>Cluster-</a:t>
-            </a:r>
-            <a:r>
-              <a:rPr lang="de-DE" dirty="0" err="1"/>
-              <a:t>Recommendations</a:t>
-            </a:r>
-            <a:endParaRPr lang="de-DE" dirty="0"/>
-          </a:p>
-        </p:txBody>
-      </p:sp>
-      <p:sp>
-        <p:nvSpPr>
-          <p:cNvPr id="3" name="Inhaltsplatzhalter 2">
-            <a:extLst>
-              <a:ext uri="{FF2B5EF4-FFF2-40B4-BE49-F238E27FC236}">
-                <a16:creationId xmlns:a16="http://schemas.microsoft.com/office/drawing/2014/main" id="{D8EB4C11-0EB3-467B-9B2F-FD1B4DAB0EE8}"/>
-              </a:ext>
-            </a:extLst>
-          </p:cNvPr>
-          <p:cNvSpPr>
-            <a:spLocks noGrp="1"/>
-          </p:cNvSpPr>
-          <p:nvPr>
-            <p:ph idx="1"/>
-          </p:nvPr>
-        </p:nvSpPr>
-        <p:spPr/>
-        <p:txBody>
-          <a:bodyPr/>
-          <a:lstStyle/>
-          <a:p>
-            <a:r>
-              <a:rPr lang="de-DE" dirty="0"/>
-              <a:t>Songs im gleichen Cluster wie der Eingabesong erhalten Punkte; mehr bei geringerer Distanz</a:t>
-            </a:r>
-          </a:p>
-          <a:p>
-            <a:r>
-              <a:rPr lang="de-DE" dirty="0"/>
-              <a:t>Die Songs mit der höchsten Bewertung werden empfohlen</a:t>
-            </a:r>
-          </a:p>
-          <a:p>
-            <a:r>
-              <a:rPr lang="de-DE" dirty="0"/>
-              <a:t>Für Tests: Songs in anderen Clustern werden anhand der Distanz zwischen deren Clusterzentrum und dem Clusterzentrum des Eingabesongs bewertet</a:t>
-            </a:r>
-          </a:p>
-        </p:txBody>
-      </p:sp>
-      <p:sp>
-        <p:nvSpPr>
-          <p:cNvPr id="4" name="Fußzeilenplatzhalter 3">
-            <a:extLst>
-              <a:ext uri="{FF2B5EF4-FFF2-40B4-BE49-F238E27FC236}">
-                <a16:creationId xmlns:a16="http://schemas.microsoft.com/office/drawing/2014/main" id="{419839C2-5D3A-E64D-9BE9-7229D4825B48}"/>
-              </a:ext>
-            </a:extLst>
-          </p:cNvPr>
-          <p:cNvSpPr>
-            <a:spLocks noGrp="1"/>
-          </p:cNvSpPr>
-          <p:nvPr>
-            <p:ph type="ftr" sz="quarter" idx="11"/>
-          </p:nvPr>
-        </p:nvSpPr>
-        <p:spPr/>
-        <p:txBody>
-          <a:bodyPr/>
-          <a:lstStyle/>
-          <a:p>
-            <a:pPr>
-              <a:defRPr/>
-            </a:pPr>
-            <a:r>
-              <a:rPr lang="en-US"/>
-              <a:t>Jiayi Wang, Tim André Zimmermann, Julian Zenker</a:t>
-            </a:r>
-          </a:p>
-        </p:txBody>
-      </p:sp>
-    </p:spTree>
-    <p:extLst>
-      <p:ext uri="{BB962C8B-B14F-4D97-AF65-F5344CB8AC3E}">
-        <p14:creationId xmlns:p14="http://schemas.microsoft.com/office/powerpoint/2010/main" val="2316979812"/>
-      </p:ext>
-    </p:extLst>
-  </p:cSld>
-  <p:clrMapOvr>
-    <a:masterClrMapping/>
-  </p:clrMapOvr>
-  <mc:AlternateContent xmlns:mc="http://schemas.openxmlformats.org/markup-compatibility/2006" xmlns:p14="http://schemas.microsoft.com/office/powerpoint/2010/main">
-    <mc:Choice Requires="p14">
-      <p:transition spd="slow" p14:dur="1300">
-        <p14:pan/>
-      </p:transition>
-    </mc:Choice>
-    <mc:Fallback xmlns="">
-      <p:transition spd="slow">
-        <p:fade/>
-      </p:transition>
-    </mc:Fallback>
-  </mc:AlternateContent>
-</p:sld>
-</file>
-
-<file path=ppt/slides/slide14.xml><?xml version="1.0" encoding="utf-8"?>
-<p:sld xmlns:a="http://schemas.openxmlformats.org/drawingml/2006/main" xmlns:r="http://schemas.openxmlformats.org/officeDocument/2006/relationships" xmlns:p="http://schemas.openxmlformats.org/presentationml/2006/main">
-  <p:cSld>
-    <p:spTree>
-      <p:nvGrpSpPr>
-        <p:cNvPr id="1" name=""/>
-        <p:cNvGrpSpPr/>
-        <p:nvPr/>
-      </p:nvGrpSpPr>
-      <p:grpSpPr>
-        <a:xfrm>
-          <a:off x="0" y="0"/>
-          <a:ext cx="0" cy="0"/>
-          <a:chOff x="0" y="0"/>
-          <a:chExt cx="0" cy="0"/>
-        </a:xfrm>
-      </p:grpSpPr>
-      <p:sp>
-        <p:nvSpPr>
-          <p:cNvPr id="2" name="Titel 1">
-            <a:extLst>
-              <a:ext uri="{FF2B5EF4-FFF2-40B4-BE49-F238E27FC236}">
-                <a16:creationId xmlns:a16="http://schemas.microsoft.com/office/drawing/2014/main" id="{0B646666-F26D-4D41-AA28-09443F3F26E6}"/>
-              </a:ext>
-            </a:extLst>
-          </p:cNvPr>
-          <p:cNvSpPr>
-            <a:spLocks noGrp="1"/>
-          </p:cNvSpPr>
-          <p:nvPr>
-            <p:ph type="title"/>
-          </p:nvPr>
-        </p:nvSpPr>
-        <p:spPr/>
-        <p:txBody>
-          <a:bodyPr>
-            <a:normAutofit fontScale="90000"/>
-          </a:bodyPr>
-          <a:lstStyle/>
-          <a:p>
-            <a:r>
-              <a:rPr lang="de-DE" dirty="0"/>
-              <a:t>Cluster-</a:t>
-            </a:r>
-            <a:r>
-              <a:rPr lang="de-DE" dirty="0" err="1"/>
-              <a:t>Recommendation</a:t>
-            </a:r>
-            <a:r>
-              <a:rPr lang="de-DE" dirty="0"/>
-              <a:t>-Tests: Punkteverteilung</a:t>
-            </a:r>
-          </a:p>
-        </p:txBody>
-      </p:sp>
-      <p:sp>
-        <p:nvSpPr>
-          <p:cNvPr id="3" name="Inhaltsplatzhalter 2">
-            <a:extLst>
-              <a:ext uri="{FF2B5EF4-FFF2-40B4-BE49-F238E27FC236}">
-                <a16:creationId xmlns:a16="http://schemas.microsoft.com/office/drawing/2014/main" id="{F360894D-5F24-4171-987F-91E796A9486C}"/>
-              </a:ext>
-            </a:extLst>
-          </p:cNvPr>
-          <p:cNvSpPr>
-            <a:spLocks noGrp="1"/>
-          </p:cNvSpPr>
-          <p:nvPr>
-            <p:ph idx="1"/>
-          </p:nvPr>
-        </p:nvSpPr>
-        <p:spPr/>
-        <p:txBody>
-          <a:bodyPr/>
-          <a:lstStyle/>
-          <a:p>
-            <a:endParaRPr lang="de-DE" dirty="0"/>
-          </a:p>
-        </p:txBody>
-      </p:sp>
-      <p:graphicFrame>
-        <p:nvGraphicFramePr>
-          <p:cNvPr id="4" name="Tabelle 3">
-            <a:extLst>
-              <a:ext uri="{FF2B5EF4-FFF2-40B4-BE49-F238E27FC236}">
-                <a16:creationId xmlns:a16="http://schemas.microsoft.com/office/drawing/2014/main" id="{2F38C89D-1077-4C8F-B19E-BE3421D6AD9F}"/>
-              </a:ext>
-            </a:extLst>
-          </p:cNvPr>
-          <p:cNvGraphicFramePr>
-            <a:graphicFrameLocks noGrp="1"/>
-          </p:cNvGraphicFramePr>
-          <p:nvPr>
-            <p:extLst>
-              <p:ext uri="{D42A27DB-BD31-4B8C-83A1-F6EECF244321}">
-                <p14:modId xmlns:p14="http://schemas.microsoft.com/office/powerpoint/2010/main" val="2893431986"/>
-              </p:ext>
-            </p:extLst>
-          </p:nvPr>
-        </p:nvGraphicFramePr>
-        <p:xfrm>
-          <a:off x="1298713" y="1934558"/>
-          <a:ext cx="6546574" cy="2828766"/>
-        </p:xfrm>
-        <a:graphic>
-          <a:graphicData uri="http://schemas.openxmlformats.org/drawingml/2006/table">
-            <a:tbl>
-              <a:tblPr firstRow="1" bandRow="1">
-                <a:tableStyleId>{D27102A9-8310-4765-A935-A1911B00CA55}</a:tableStyleId>
-              </a:tblPr>
-              <a:tblGrid>
-                <a:gridCol w="4959741">
-                  <a:extLst>
-                    <a:ext uri="{9D8B030D-6E8A-4147-A177-3AD203B41FA5}">
-                      <a16:colId xmlns:a16="http://schemas.microsoft.com/office/drawing/2014/main" val="236739624"/>
-                    </a:ext>
-                  </a:extLst>
-                </a:gridCol>
-                <a:gridCol w="1586833">
-                  <a:extLst>
-                    <a:ext uri="{9D8B030D-6E8A-4147-A177-3AD203B41FA5}">
-                      <a16:colId xmlns:a16="http://schemas.microsoft.com/office/drawing/2014/main" val="3613010800"/>
-                    </a:ext>
-                  </a:extLst>
-                </a:gridCol>
-              </a:tblGrid>
-              <a:tr h="471461">
-                <a:tc>
-                  <a:txBody>
-                    <a:bodyPr/>
-                    <a:lstStyle/>
-                    <a:p>
-                      <a:r>
-                        <a:rPr lang="de-DE" sz="1400" dirty="0"/>
-                        <a:t>Einteilung</a:t>
-                      </a:r>
-                    </a:p>
-                  </a:txBody>
-                  <a:tcPr marL="68580" marR="68580" marT="34290" marB="34290" anchor="ctr"/>
-                </a:tc>
-                <a:tc>
-                  <a:txBody>
-                    <a:bodyPr/>
-                    <a:lstStyle/>
-                    <a:p>
-                      <a:r>
-                        <a:rPr lang="de-DE" sz="1400" dirty="0"/>
-                        <a:t>Punktzahl</a:t>
-                      </a:r>
-                    </a:p>
-                  </a:txBody>
-                  <a:tcPr marL="68580" marR="68580" marT="34290" marB="34290" anchor="ctr"/>
-                </a:tc>
-                <a:extLst>
-                  <a:ext uri="{0D108BD9-81ED-4DB2-BD59-A6C34878D82A}">
-                    <a16:rowId xmlns:a16="http://schemas.microsoft.com/office/drawing/2014/main" val="684904303"/>
-                  </a:ext>
-                </a:extLst>
-              </a:tr>
-              <a:tr h="471461">
-                <a:tc>
-                  <a:txBody>
-                    <a:bodyPr/>
-                    <a:lstStyle/>
-                    <a:p>
-                      <a:r>
-                        <a:rPr lang="de-DE" sz="1400" dirty="0"/>
-                        <a:t>Songs im selben Cluster</a:t>
-                      </a:r>
-                    </a:p>
-                  </a:txBody>
-                  <a:tcPr marL="68580" marR="68580" marT="34290" marB="34290" anchor="ctr"/>
-                </a:tc>
-                <a:tc>
-                  <a:txBody>
-                    <a:bodyPr/>
-                    <a:lstStyle/>
-                    <a:p>
-                      <a:r>
-                        <a:rPr lang="de-DE" sz="1400" dirty="0"/>
-                        <a:t>8-10 Punkte</a:t>
-                      </a:r>
-                    </a:p>
-                  </a:txBody>
-                  <a:tcPr marL="68580" marR="68580" marT="34290" marB="34290" anchor="ctr"/>
-                </a:tc>
-                <a:extLst>
-                  <a:ext uri="{0D108BD9-81ED-4DB2-BD59-A6C34878D82A}">
-                    <a16:rowId xmlns:a16="http://schemas.microsoft.com/office/drawing/2014/main" val="163419379"/>
-                  </a:ext>
-                </a:extLst>
-              </a:tr>
-              <a:tr h="471461">
-                <a:tc>
-                  <a:txBody>
-                    <a:bodyPr/>
-                    <a:lstStyle/>
-                    <a:p>
-                      <a:r>
-                        <a:rPr lang="de-DE" sz="1400" dirty="0"/>
-                        <a:t>Zentren-Distanz ≤ 10% von der durchschnittlichen Distanz</a:t>
-                      </a:r>
-                    </a:p>
-                  </a:txBody>
-                  <a:tcPr marL="68580" marR="68580" marT="34290" marB="34290" anchor="ctr"/>
-                </a:tc>
-                <a:tc>
-                  <a:txBody>
-                    <a:bodyPr/>
-                    <a:lstStyle/>
-                    <a:p>
-                      <a:r>
-                        <a:rPr lang="de-DE" sz="1400" dirty="0"/>
-                        <a:t>6-7 Punkte</a:t>
-                      </a:r>
-                    </a:p>
-                  </a:txBody>
-                  <a:tcPr marL="68580" marR="68580" marT="34290" marB="34290" anchor="ctr"/>
-                </a:tc>
-                <a:extLst>
-                  <a:ext uri="{0D108BD9-81ED-4DB2-BD59-A6C34878D82A}">
-                    <a16:rowId xmlns:a16="http://schemas.microsoft.com/office/drawing/2014/main" val="3871737911"/>
-                  </a:ext>
-                </a:extLst>
-              </a:tr>
-              <a:tr h="471461">
-                <a:tc>
-                  <a:txBody>
-                    <a:bodyPr/>
-                    <a:lstStyle/>
-                    <a:p>
-                      <a:r>
-                        <a:rPr lang="de-DE" sz="1400" dirty="0"/>
-                        <a:t>Zentren-Distanz ≤ 25% von der durchschnittlichen Distanz</a:t>
-                      </a:r>
-                    </a:p>
-                  </a:txBody>
-                  <a:tcPr marL="68580" marR="68580" marT="34290" marB="34290" anchor="ctr"/>
-                </a:tc>
-                <a:tc>
-                  <a:txBody>
-                    <a:bodyPr/>
-                    <a:lstStyle/>
-                    <a:p>
-                      <a:r>
-                        <a:rPr lang="de-DE" sz="1400" dirty="0"/>
-                        <a:t>4-5 Punkte</a:t>
-                      </a:r>
-                    </a:p>
-                  </a:txBody>
-                  <a:tcPr marL="68580" marR="68580" marT="34290" marB="34290" anchor="ctr"/>
-                </a:tc>
-                <a:extLst>
-                  <a:ext uri="{0D108BD9-81ED-4DB2-BD59-A6C34878D82A}">
-                    <a16:rowId xmlns:a16="http://schemas.microsoft.com/office/drawing/2014/main" val="3214466596"/>
-                  </a:ext>
-                </a:extLst>
-              </a:tr>
-              <a:tr h="471461">
-                <a:tc>
-                  <a:txBody>
-                    <a:bodyPr/>
-                    <a:lstStyle/>
-                    <a:p>
-                      <a:r>
-                        <a:rPr lang="de-DE" sz="1400" dirty="0"/>
-                        <a:t>Zentren-Distanz ≤ 50% von der durchschnittlichen Distanz</a:t>
-                      </a:r>
-                    </a:p>
-                  </a:txBody>
-                  <a:tcPr marL="68580" marR="68580" marT="34290" marB="34290" anchor="ctr"/>
-                </a:tc>
-                <a:tc>
-                  <a:txBody>
-                    <a:bodyPr/>
-                    <a:lstStyle/>
-                    <a:p>
-                      <a:r>
-                        <a:rPr lang="de-DE" sz="1400" dirty="0"/>
-                        <a:t>2-3 Punkte</a:t>
-                      </a:r>
-                    </a:p>
-                  </a:txBody>
-                  <a:tcPr marL="68580" marR="68580" marT="34290" marB="34290" anchor="ctr"/>
-                </a:tc>
-                <a:extLst>
-                  <a:ext uri="{0D108BD9-81ED-4DB2-BD59-A6C34878D82A}">
-                    <a16:rowId xmlns:a16="http://schemas.microsoft.com/office/drawing/2014/main" val="4261290450"/>
-                  </a:ext>
-                </a:extLst>
-              </a:tr>
-              <a:tr h="471461">
-                <a:tc>
-                  <a:txBody>
-                    <a:bodyPr/>
-                    <a:lstStyle/>
-                    <a:p>
-                      <a:r>
-                        <a:rPr lang="de-DE" sz="1400" dirty="0"/>
-                        <a:t>Restliche Songs</a:t>
-                      </a:r>
-                    </a:p>
-                  </a:txBody>
-                  <a:tcPr marL="68580" marR="68580" marT="34290" marB="34290" anchor="ctr"/>
-                </a:tc>
-                <a:tc>
-                  <a:txBody>
-                    <a:bodyPr/>
-                    <a:lstStyle/>
-                    <a:p>
-                      <a:r>
-                        <a:rPr lang="de-DE" sz="1400" dirty="0"/>
-                        <a:t>0 Punkte</a:t>
-                      </a:r>
-                    </a:p>
-                  </a:txBody>
-                  <a:tcPr marL="68580" marR="68580" marT="34290" marB="34290" anchor="ctr"/>
-                </a:tc>
-                <a:extLst>
-                  <a:ext uri="{0D108BD9-81ED-4DB2-BD59-A6C34878D82A}">
-                    <a16:rowId xmlns:a16="http://schemas.microsoft.com/office/drawing/2014/main" val="2054115088"/>
-                  </a:ext>
-                </a:extLst>
-              </a:tr>
-            </a:tbl>
-          </a:graphicData>
-        </a:graphic>
-      </p:graphicFrame>
-      <p:sp>
-        <p:nvSpPr>
-          <p:cNvPr id="5" name="Fußzeilenplatzhalter 4">
-            <a:extLst>
-              <a:ext uri="{FF2B5EF4-FFF2-40B4-BE49-F238E27FC236}">
-                <a16:creationId xmlns:a16="http://schemas.microsoft.com/office/drawing/2014/main" id="{9EFA1EE3-BB25-DC4D-8942-CAD569845431}"/>
-              </a:ext>
-            </a:extLst>
-          </p:cNvPr>
-          <p:cNvSpPr>
-            <a:spLocks noGrp="1"/>
-          </p:cNvSpPr>
-          <p:nvPr>
-            <p:ph type="ftr" sz="quarter" idx="11"/>
-          </p:nvPr>
-        </p:nvSpPr>
-        <p:spPr/>
-        <p:txBody>
-          <a:bodyPr/>
-          <a:lstStyle/>
-          <a:p>
-            <a:pPr>
-              <a:defRPr/>
-            </a:pPr>
-            <a:r>
-              <a:rPr lang="en-US"/>
-              <a:t>Jiayi Wang, Tim André Zimmermann, Julian Zenker</a:t>
-            </a:r>
-          </a:p>
-        </p:txBody>
-      </p:sp>
-    </p:spTree>
-    <p:extLst>
-      <p:ext uri="{BB962C8B-B14F-4D97-AF65-F5344CB8AC3E}">
-        <p14:creationId xmlns:p14="http://schemas.microsoft.com/office/powerpoint/2010/main" val="357690208"/>
       </p:ext>
     </p:extLst>
   </p:cSld>
@@ -11851,7 +11897,7 @@
             <p:ph idx="1"/>
             <p:extLst>
               <p:ext uri="{D42A27DB-BD31-4B8C-83A1-F6EECF244321}">
-                <p14:modId xmlns:p14="http://schemas.microsoft.com/office/powerpoint/2010/main" val="2667140908"/>
+                <p14:modId xmlns:p14="http://schemas.microsoft.com/office/powerpoint/2010/main" val="695502524"/>
               </p:ext>
             </p:extLst>
           </p:nvPr>
@@ -11941,10 +11987,43 @@
       </p:grpSpPr>
       <p:sp>
         <p:nvSpPr>
+          <p:cNvPr id="2" name="Titel 1">
+            <a:extLst>
+              <a:ext uri="{FF2B5EF4-FFF2-40B4-BE49-F238E27FC236}">
+                <a16:creationId xmlns:a16="http://schemas.microsoft.com/office/drawing/2014/main" id="{2D2DCD53-DC03-4F6C-B120-8945AF9981E4}"/>
+              </a:ext>
+            </a:extLst>
+          </p:cNvPr>
+          <p:cNvSpPr>
+            <a:spLocks noGrp="1"/>
+          </p:cNvSpPr>
+          <p:nvPr>
+            <p:ph type="title"/>
+          </p:nvPr>
+        </p:nvSpPr>
+        <p:spPr/>
+        <p:txBody>
+          <a:bodyPr/>
+          <a:lstStyle/>
+          <a:p>
+            <a:r>
+              <a:rPr lang="de-DE" dirty="0"/>
+              <a:t>Cluster-</a:t>
+            </a:r>
+            <a:r>
+              <a:rPr lang="de-DE" dirty="0" err="1"/>
+              <a:t>Recommendations</a:t>
+            </a:r>
+            <a:endParaRPr lang="de-DE" dirty="0"/>
+          </a:p>
+        </p:txBody>
+      </p:sp>
+      <p:sp>
+        <p:nvSpPr>
           <p:cNvPr id="3" name="Inhaltsplatzhalter 2">
             <a:extLst>
               <a:ext uri="{FF2B5EF4-FFF2-40B4-BE49-F238E27FC236}">
-                <a16:creationId xmlns:a16="http://schemas.microsoft.com/office/drawing/2014/main" id="{73B83135-BA91-4DEA-A04F-118EB307111D}"/>
+                <a16:creationId xmlns:a16="http://schemas.microsoft.com/office/drawing/2014/main" id="{D8EB4C11-0EB3-467B-9B2F-FD1B4DAB0EE8}"/>
               </a:ext>
             </a:extLst>
           </p:cNvPr>
@@ -11961,61 +12040,21 @@
           <a:lstStyle/>
           <a:p>
             <a:r>
-              <a:rPr lang="de-DE" sz="2400" dirty="0"/>
-              <a:t>Vergleich mit den User Counts:</a:t>
-            </a:r>
-          </a:p>
-          <a:p>
-            <a:pPr lvl="1">
-              <a:buFont typeface="Wingdings" pitchFamily="2" charset="2"/>
-              <a:buChar char="§"/>
-            </a:pPr>
-            <a:r>
               <a:rPr lang="de-DE" dirty="0"/>
-              <a:t>Die Songs, die nur einmal von einem User gehört wurden, als „nicht gemocht“ betrachten</a:t>
-            </a:r>
-            <a:br>
+              <a:t>Songs im gleichen Cluster wie der Eingabesong erhalten Punkte; mehr bei geringerer Distanz</a:t>
+            </a:r>
+          </a:p>
+          <a:p>
+            <a:r>
               <a:rPr lang="de-DE" dirty="0"/>
-            </a:br>
-            <a:r>
-              <a:rPr lang="de-DE" dirty="0">
-                <a:sym typeface="Wingdings" panose="05000000000000000000" pitchFamily="2" charset="2"/>
-              </a:rPr>
-              <a:t> Welche Bewertungen haben solche Songs?</a:t>
-            </a:r>
-          </a:p>
-          <a:p>
-            <a:pPr lvl="1">
-              <a:buFont typeface="Wingdings" pitchFamily="2" charset="2"/>
-              <a:buChar char="§"/>
-            </a:pPr>
-            <a:endParaRPr lang="de-DE" dirty="0">
-              <a:sym typeface="Wingdings" panose="05000000000000000000" pitchFamily="2" charset="2"/>
-            </a:endParaRPr>
-          </a:p>
-          <a:p>
-            <a:pPr lvl="1">
-              <a:buFont typeface="Wingdings" pitchFamily="2" charset="2"/>
-              <a:buChar char="§"/>
-            </a:pPr>
-            <a:r>
-              <a:rPr lang="de-DE" dirty="0">
-                <a:sym typeface="Wingdings" panose="05000000000000000000" pitchFamily="2" charset="2"/>
-              </a:rPr>
-              <a:t>Ergebnis:</a:t>
-            </a:r>
-            <a:br>
-              <a:rPr lang="de-DE" dirty="0">
-                <a:sym typeface="Wingdings" panose="05000000000000000000" pitchFamily="2" charset="2"/>
-              </a:rPr>
-            </a:br>
-            <a:r>
-              <a:rPr lang="de-DE" dirty="0">
-                <a:sym typeface="Wingdings" panose="05000000000000000000" pitchFamily="2" charset="2"/>
-              </a:rPr>
-              <a:t> Deutlich verbesserungswürdig – die nicht gemochten Songs haben nur etwas weniger Punkte als die gemochten</a:t>
-            </a:r>
-            <a:endParaRPr lang="de-DE" dirty="0"/>
+              <a:t>Die Songs mit der höchsten Bewertung werden empfohlen</a:t>
+            </a:r>
+          </a:p>
+          <a:p>
+            <a:r>
+              <a:rPr lang="de-DE" dirty="0"/>
+              <a:t>Für Tests: Songs in anderen Clustern werden anhand der Distanz zwischen deren Clusterzentrum und dem Clusterzentrum des Eingabesongs bewertet</a:t>
+            </a:r>
           </a:p>
         </p:txBody>
       </p:sp>
@@ -12024,7 +12063,7 @@
           <p:cNvPr id="4" name="Fußzeilenplatzhalter 3">
             <a:extLst>
               <a:ext uri="{FF2B5EF4-FFF2-40B4-BE49-F238E27FC236}">
-                <a16:creationId xmlns:a16="http://schemas.microsoft.com/office/drawing/2014/main" id="{B7CFE3D1-D86D-AF4C-A1AC-18D8F34B7D71}"/>
+                <a16:creationId xmlns:a16="http://schemas.microsoft.com/office/drawing/2014/main" id="{419839C2-5D3A-E64D-9BE9-7229D4825B48}"/>
               </a:ext>
             </a:extLst>
           </p:cNvPr>
@@ -12050,53 +12089,10 @@
           </a:p>
         </p:txBody>
       </p:sp>
-      <p:sp>
-        <p:nvSpPr>
-          <p:cNvPr id="7" name="Titel 1">
-            <a:extLst>
-              <a:ext uri="{FF2B5EF4-FFF2-40B4-BE49-F238E27FC236}">
-                <a16:creationId xmlns:a16="http://schemas.microsoft.com/office/drawing/2014/main" id="{048C01C5-291D-4951-9D60-9795FC9B320F}"/>
-              </a:ext>
-            </a:extLst>
-          </p:cNvPr>
-          <p:cNvSpPr>
-            <a:spLocks noGrp="1"/>
-          </p:cNvSpPr>
-          <p:nvPr>
-            <p:ph type="title"/>
-          </p:nvPr>
-        </p:nvSpPr>
-        <p:spPr>
-          <a:xfrm>
-            <a:off x="323528" y="332656"/>
-            <a:ext cx="8385497" cy="719137"/>
-          </a:xfrm>
-        </p:spPr>
-        <p:txBody>
-          <a:bodyPr>
-            <a:normAutofit fontScale="90000"/>
-          </a:bodyPr>
-          <a:lstStyle/>
-          <a:p>
-            <a:r>
-              <a:rPr lang="de-DE" dirty="0"/>
-              <a:t>Güte des </a:t>
-            </a:r>
-            <a:r>
-              <a:rPr lang="de-DE" dirty="0" err="1"/>
-              <a:t>Clusterings</a:t>
-            </a:r>
-            <a:r>
-              <a:rPr lang="de-DE" dirty="0"/>
-              <a:t> – Punkte der (nicht) gemochten Songs</a:t>
-            </a:r>
-          </a:p>
-        </p:txBody>
-      </p:sp>
     </p:spTree>
     <p:extLst>
       <p:ext uri="{BB962C8B-B14F-4D97-AF65-F5344CB8AC3E}">
-        <p14:creationId xmlns:p14="http://schemas.microsoft.com/office/powerpoint/2010/main" val="2427338943"/>
+        <p14:creationId xmlns:p14="http://schemas.microsoft.com/office/powerpoint/2010/main" val="3194002945"/>
       </p:ext>
     </p:extLst>
   </p:cSld>

</xml_diff>